<commit_message>
added more slides for ds1
</commit_message>
<xml_diff>
--- a/docs/distributedsystemtransaction.pptx
+++ b/docs/distributedsystemtransaction.pptx
@@ -45,7 +45,17 @@
     <p:sldId id="277" r:id="rId38"/>
     <p:sldId id="278" r:id="rId39"/>
     <p:sldId id="279" r:id="rId40"/>
-    <p:sldId id="293" r:id="rId41"/>
+    <p:sldId id="325" r:id="rId41"/>
+    <p:sldId id="326" r:id="rId42"/>
+    <p:sldId id="327" r:id="rId43"/>
+    <p:sldId id="328" r:id="rId44"/>
+    <p:sldId id="329" r:id="rId45"/>
+    <p:sldId id="330" r:id="rId46"/>
+    <p:sldId id="331" r:id="rId47"/>
+    <p:sldId id="332" r:id="rId48"/>
+    <p:sldId id="333" r:id="rId49"/>
+    <p:sldId id="334" r:id="rId50"/>
+    <p:sldId id="293" r:id="rId51"/>
   </p:sldIdLst>
   <p:sldSz cx="12192000" cy="6858000"/>
   <p:notesSz cx="6858000" cy="9144000"/>
@@ -154,38 +164,41 @@
         </p14:section>
         <p14:section name="分布式事务" id="{9bd903e1-33a4-489f-9a0f-73afc4a7cf46}">
           <p14:sldIdLst>
-            <p14:sldId id="260"/>
-            <p14:sldId id="292"/>
             <p14:sldId id="257"/>
             <p14:sldId id="259"/>
             <p14:sldId id="258"/>
+            <p14:sldId id="260"/>
+            <p14:sldId id="292"/>
           </p14:sldIdLst>
         </p14:section>
         <p14:section name="Spring分布式实现" id="{41e07a71-3558-4fa5-8638-b04a83776b83}">
           <p14:sldIdLst>
             <p14:sldId id="261"/>
+            <p14:sldId id="280"/>
+            <p14:sldId id="281"/>
             <p14:sldId id="282"/>
+            <p14:sldId id="283"/>
+            <p14:sldId id="284"/>
+            <p14:sldId id="285"/>
+            <p14:sldId id="286"/>
+            <p14:sldId id="287"/>
+            <p14:sldId id="288"/>
+            <p14:sldId id="262"/>
             <p14:sldId id="263"/>
+            <p14:sldId id="289"/>
             <p14:sldId id="290"/>
             <p14:sldId id="291"/>
             <p14:sldId id="264"/>
             <p14:sldId id="265"/>
             <p14:sldId id="266"/>
-            <p14:sldId id="280"/>
-            <p14:sldId id="284"/>
-            <p14:sldId id="285"/>
-            <p14:sldId id="286"/>
-            <p14:sldId id="288"/>
-            <p14:sldId id="281"/>
-            <p14:sldId id="262"/>
-            <p14:sldId id="287"/>
-            <p14:sldId id="283"/>
-            <p14:sldId id="289"/>
           </p14:sldIdLst>
         </p14:section>
         <p14:section name="不使用JTA" id="{a1e4495f-3ef2-4370-a049-5ea14e4c5b0b}">
           <p14:sldIdLst>
+            <p14:sldId id="267"/>
+            <p14:sldId id="268"/>
             <p14:sldId id="269"/>
+            <p14:sldId id="270"/>
             <p14:sldId id="271"/>
             <p14:sldId id="272"/>
             <p14:sldId id="273"/>
@@ -195,9 +208,20 @@
             <p14:sldId id="277"/>
             <p14:sldId id="278"/>
             <p14:sldId id="279"/>
-            <p14:sldId id="268"/>
-            <p14:sldId id="270"/>
-            <p14:sldId id="267"/>
+          </p14:sldIdLst>
+        </p14:section>
+        <p14:section name="分布式事务实现的模式与技术" id="{da5c7ad6-713f-4a2f-997d-27194b135141}">
+          <p14:sldIdLst>
+            <p14:sldId id="325"/>
+            <p14:sldId id="327"/>
+            <p14:sldId id="328"/>
+            <p14:sldId id="329"/>
+            <p14:sldId id="330"/>
+            <p14:sldId id="331"/>
+            <p14:sldId id="332"/>
+            <p14:sldId id="333"/>
+            <p14:sldId id="334"/>
+            <p14:sldId id="326"/>
           </p14:sldIdLst>
         </p14:section>
         <p14:section name="参考资料" id="{18cec514-9ae0-4c12-9247-8aaeda3d09e6}">
@@ -1900,6 +1924,370 @@
 </p:notes>
 </file>
 
+<file path=ppt/notesSlides/notesSlide33.xml><?xml version="1.0" encoding="utf-8"?>
+<p:notes xmlns:a="http://schemas.openxmlformats.org/drawingml/2006/main" xmlns:r="http://schemas.openxmlformats.org/officeDocument/2006/relationships" xmlns:p="http://schemas.openxmlformats.org/presentationml/2006/main">
+  <p:cSld>
+    <p:spTree>
+      <p:nvGrpSpPr>
+        <p:cNvPr id="1" name=""/>
+        <p:cNvGrpSpPr/>
+        <p:nvPr/>
+      </p:nvGrpSpPr>
+      <p:grpSpPr/>
+      <p:sp>
+        <p:nvSpPr>
+          <p:cNvPr id="2" name="幻灯片图像占位符 1"/>
+          <p:cNvSpPr/>
+          <p:nvPr>
+            <p:ph type="sldImg" idx="2"/>
+          </p:nvPr>
+        </p:nvSpPr>
+        <p:spPr/>
+      </p:sp>
+      <p:sp>
+        <p:nvSpPr>
+          <p:cNvPr id="3" name="文本占位符 2"/>
+          <p:cNvSpPr/>
+          <p:nvPr>
+            <p:ph type="body" idx="3"/>
+          </p:nvPr>
+        </p:nvSpPr>
+        <p:spPr/>
+        <p:txBody>
+          <a:bodyPr/>
+          <a:p>
+            <a:r>
+              <a:rPr lang="zh-CN" altLang="en-US"/>
+              <a:t>分布式事务实现的几种模式</a:t>
+            </a:r>
+            <a:endParaRPr lang="zh-CN" altLang="en-US"/>
+          </a:p>
+          <a:p>
+            <a:r>
+              <a:rPr lang="zh-CN" altLang="en-US"/>
+              <a:t>幂等性，唯一性</a:t>
+            </a:r>
+            <a:r>
+              <a:rPr lang="en-US" altLang="zh-CN"/>
+              <a:t>ID</a:t>
+            </a:r>
+            <a:endParaRPr lang="en-US" altLang="zh-CN"/>
+          </a:p>
+          <a:p>
+            <a:r>
+              <a:rPr lang="zh-CN" altLang="en-US"/>
+              <a:t>分布式锁与对象</a:t>
+            </a:r>
+            <a:endParaRPr lang="zh-CN" altLang="en-US"/>
+          </a:p>
+        </p:txBody>
+      </p:sp>
+    </p:spTree>
+  </p:cSld>
+  <p:clrMapOvr>
+    <a:masterClrMapping/>
+  </p:clrMapOvr>
+</p:notes>
+</file>
+
+<file path=ppt/notesSlides/notesSlide34.xml><?xml version="1.0" encoding="utf-8"?>
+<p:notes xmlns:a="http://schemas.openxmlformats.org/drawingml/2006/main" xmlns:r="http://schemas.openxmlformats.org/officeDocument/2006/relationships" xmlns:p="http://schemas.openxmlformats.org/presentationml/2006/main">
+  <p:cSld>
+    <p:spTree>
+      <p:nvGrpSpPr>
+        <p:cNvPr id="1" name=""/>
+        <p:cNvGrpSpPr/>
+        <p:nvPr/>
+      </p:nvGrpSpPr>
+      <p:grpSpPr/>
+      <p:sp>
+        <p:nvSpPr>
+          <p:cNvPr id="2" name="幻灯片图像占位符 1"/>
+          <p:cNvSpPr/>
+          <p:nvPr>
+            <p:ph type="sldImg" idx="2"/>
+          </p:nvPr>
+        </p:nvSpPr>
+        <p:spPr/>
+      </p:sp>
+      <p:sp>
+        <p:nvSpPr>
+          <p:cNvPr id="3" name="文本占位符 2"/>
+          <p:cNvSpPr/>
+          <p:nvPr>
+            <p:ph type="body" idx="3"/>
+          </p:nvPr>
+        </p:nvSpPr>
+        <p:spPr/>
+        <p:txBody>
+          <a:bodyPr/>
+          <a:p>
+            <a:r>
+              <a:rPr lang="en-US" altLang="zh-CN"/>
+              <a:t>Event Sourcing: </a:t>
+            </a:r>
+            <a:r>
+              <a:rPr lang="zh-CN" altLang="en-US"/>
+              <a:t>只会使用一个</a:t>
+            </a:r>
+            <a:r>
+              <a:rPr lang="en-US" altLang="zh-CN"/>
+              <a:t>event store</a:t>
+            </a:r>
+            <a:r>
+              <a:rPr lang="zh-CN" altLang="en-US"/>
+              <a:t>的数据源</a:t>
+            </a:r>
+            <a:endParaRPr lang="zh-CN" altLang="en-US"/>
+          </a:p>
+          <a:p>
+            <a:r>
+              <a:rPr lang="en-US" altLang="zh-CN"/>
+              <a:t>TCC</a:t>
+            </a:r>
+            <a:r>
+              <a:rPr lang="zh-CN" altLang="en-US"/>
+              <a:t>： 服务间调用的时候</a:t>
+            </a:r>
+            <a:endParaRPr lang="zh-CN" altLang="en-US"/>
+          </a:p>
+          <a:p>
+            <a:endParaRPr lang="zh-CN" altLang="en-US"/>
+          </a:p>
+        </p:txBody>
+      </p:sp>
+    </p:spTree>
+  </p:cSld>
+  <p:clrMapOvr>
+    <a:masterClrMapping/>
+  </p:clrMapOvr>
+</p:notes>
+</file>
+
+<file path=ppt/notesSlides/notesSlide35.xml><?xml version="1.0" encoding="utf-8"?>
+<p:notes xmlns:a="http://schemas.openxmlformats.org/drawingml/2006/main" xmlns:r="http://schemas.openxmlformats.org/officeDocument/2006/relationships" xmlns:p="http://schemas.openxmlformats.org/presentationml/2006/main">
+  <p:cSld>
+    <p:spTree>
+      <p:nvGrpSpPr>
+        <p:cNvPr id="1" name=""/>
+        <p:cNvGrpSpPr/>
+        <p:nvPr/>
+      </p:nvGrpSpPr>
+      <p:grpSpPr/>
+      <p:sp>
+        <p:nvSpPr>
+          <p:cNvPr id="2" name="幻灯片图像占位符 1"/>
+          <p:cNvSpPr/>
+          <p:nvPr>
+            <p:ph type="sldImg" idx="2"/>
+          </p:nvPr>
+        </p:nvSpPr>
+        <p:spPr/>
+      </p:sp>
+      <p:sp>
+        <p:nvSpPr>
+          <p:cNvPr id="3" name="文本占位符 2"/>
+          <p:cNvSpPr/>
+          <p:nvPr>
+            <p:ph type="body" idx="3"/>
+          </p:nvPr>
+        </p:nvSpPr>
+        <p:spPr/>
+        <p:txBody>
+          <a:bodyPr/>
+          <a:p>
+            <a:endParaRPr lang="zh-CN" altLang="en-US"/>
+          </a:p>
+        </p:txBody>
+      </p:sp>
+    </p:spTree>
+  </p:cSld>
+  <p:clrMapOvr>
+    <a:masterClrMapping/>
+  </p:clrMapOvr>
+</p:notes>
+</file>
+
+<file path=ppt/notesSlides/notesSlide36.xml><?xml version="1.0" encoding="utf-8"?>
+<p:notes xmlns:a="http://schemas.openxmlformats.org/drawingml/2006/main" xmlns:r="http://schemas.openxmlformats.org/officeDocument/2006/relationships" xmlns:p="http://schemas.openxmlformats.org/presentationml/2006/main">
+  <p:cSld>
+    <p:spTree>
+      <p:nvGrpSpPr>
+        <p:cNvPr id="1" name=""/>
+        <p:cNvGrpSpPr/>
+        <p:nvPr/>
+      </p:nvGrpSpPr>
+      <p:grpSpPr/>
+      <p:sp>
+        <p:nvSpPr>
+          <p:cNvPr id="2" name="幻灯片图像占位符 1"/>
+          <p:cNvSpPr/>
+          <p:nvPr>
+            <p:ph type="sldImg" idx="2"/>
+          </p:nvPr>
+        </p:nvSpPr>
+        <p:spPr/>
+      </p:sp>
+      <p:sp>
+        <p:nvSpPr>
+          <p:cNvPr id="3" name="文本占位符 2"/>
+          <p:cNvSpPr/>
+          <p:nvPr>
+            <p:ph type="body" idx="3"/>
+          </p:nvPr>
+        </p:nvSpPr>
+        <p:spPr/>
+        <p:txBody>
+          <a:bodyPr/>
+          <a:p>
+            <a:r>
+              <a:rPr lang="zh-CN" altLang="en-US"/>
+              <a:t>微服务的安全性和幂等性。</a:t>
+            </a:r>
+            <a:endParaRPr lang="zh-CN" altLang="en-US"/>
+          </a:p>
+        </p:txBody>
+      </p:sp>
+    </p:spTree>
+  </p:cSld>
+  <p:clrMapOvr>
+    <a:masterClrMapping/>
+  </p:clrMapOvr>
+</p:notes>
+</file>
+
+<file path=ppt/notesSlides/notesSlide37.xml><?xml version="1.0" encoding="utf-8"?>
+<p:notes xmlns:a="http://schemas.openxmlformats.org/drawingml/2006/main" xmlns:r="http://schemas.openxmlformats.org/officeDocument/2006/relationships" xmlns:p="http://schemas.openxmlformats.org/presentationml/2006/main">
+  <p:cSld>
+    <p:spTree>
+      <p:nvGrpSpPr>
+        <p:cNvPr id="1" name=""/>
+        <p:cNvGrpSpPr/>
+        <p:nvPr/>
+      </p:nvGrpSpPr>
+      <p:grpSpPr/>
+      <p:sp>
+        <p:nvSpPr>
+          <p:cNvPr id="2" name="幻灯片图像占位符 1"/>
+          <p:cNvSpPr/>
+          <p:nvPr>
+            <p:ph type="sldImg" idx="2"/>
+          </p:nvPr>
+        </p:nvSpPr>
+        <p:spPr/>
+      </p:sp>
+      <p:sp>
+        <p:nvSpPr>
+          <p:cNvPr id="3" name="文本占位符 2"/>
+          <p:cNvSpPr/>
+          <p:nvPr>
+            <p:ph type="body" idx="3"/>
+          </p:nvPr>
+        </p:nvSpPr>
+        <p:spPr/>
+        <p:txBody>
+          <a:bodyPr/>
+          <a:p>
+            <a:endParaRPr lang="zh-CN" altLang="en-US"/>
+          </a:p>
+        </p:txBody>
+      </p:sp>
+    </p:spTree>
+  </p:cSld>
+  <p:clrMapOvr>
+    <a:masterClrMapping/>
+  </p:clrMapOvr>
+</p:notes>
+</file>
+
+<file path=ppt/notesSlides/notesSlide38.xml><?xml version="1.0" encoding="utf-8"?>
+<p:notes xmlns:a="http://schemas.openxmlformats.org/drawingml/2006/main" xmlns:r="http://schemas.openxmlformats.org/officeDocument/2006/relationships" xmlns:p="http://schemas.openxmlformats.org/presentationml/2006/main">
+  <p:cSld>
+    <p:spTree>
+      <p:nvGrpSpPr>
+        <p:cNvPr id="1" name=""/>
+        <p:cNvGrpSpPr/>
+        <p:nvPr/>
+      </p:nvGrpSpPr>
+      <p:grpSpPr/>
+      <p:sp>
+        <p:nvSpPr>
+          <p:cNvPr id="2" name="幻灯片图像占位符 1"/>
+          <p:cNvSpPr/>
+          <p:nvPr>
+            <p:ph type="sldImg" idx="2"/>
+          </p:nvPr>
+        </p:nvSpPr>
+        <p:spPr/>
+      </p:sp>
+      <p:sp>
+        <p:nvSpPr>
+          <p:cNvPr id="3" name="文本占位符 2"/>
+          <p:cNvSpPr/>
+          <p:nvPr>
+            <p:ph type="body" idx="3"/>
+          </p:nvPr>
+        </p:nvSpPr>
+        <p:spPr/>
+        <p:txBody>
+          <a:bodyPr/>
+          <a:p>
+            <a:endParaRPr lang="zh-CN" altLang="en-US"/>
+          </a:p>
+        </p:txBody>
+      </p:sp>
+    </p:spTree>
+  </p:cSld>
+  <p:clrMapOvr>
+    <a:masterClrMapping/>
+  </p:clrMapOvr>
+</p:notes>
+</file>
+
+<file path=ppt/notesSlides/notesSlide39.xml><?xml version="1.0" encoding="utf-8"?>
+<p:notes xmlns:a="http://schemas.openxmlformats.org/drawingml/2006/main" xmlns:r="http://schemas.openxmlformats.org/officeDocument/2006/relationships" xmlns:p="http://schemas.openxmlformats.org/presentationml/2006/main">
+  <p:cSld>
+    <p:spTree>
+      <p:nvGrpSpPr>
+        <p:cNvPr id="1" name=""/>
+        <p:cNvGrpSpPr/>
+        <p:nvPr/>
+      </p:nvGrpSpPr>
+      <p:grpSpPr/>
+      <p:sp>
+        <p:nvSpPr>
+          <p:cNvPr id="2" name="幻灯片图像占位符 1"/>
+          <p:cNvSpPr/>
+          <p:nvPr>
+            <p:ph type="sldImg" idx="2"/>
+          </p:nvPr>
+        </p:nvSpPr>
+        <p:spPr/>
+      </p:sp>
+      <p:sp>
+        <p:nvSpPr>
+          <p:cNvPr id="3" name="文本占位符 2"/>
+          <p:cNvSpPr/>
+          <p:nvPr>
+            <p:ph type="body" idx="3"/>
+          </p:nvPr>
+        </p:nvSpPr>
+        <p:spPr/>
+        <p:txBody>
+          <a:bodyPr/>
+          <a:p>
+            <a:endParaRPr lang="zh-CN" altLang="en-US"/>
+          </a:p>
+        </p:txBody>
+      </p:sp>
+    </p:spTree>
+  </p:cSld>
+  <p:clrMapOvr>
+    <a:masterClrMapping/>
+  </p:clrMapOvr>
+</p:notes>
+</file>
+
 <file path=ppt/notesSlides/notesSlide4.xml><?xml version="1.0" encoding="utf-8"?>
 <p:notes xmlns:a="http://schemas.openxmlformats.org/drawingml/2006/main" xmlns:r="http://schemas.openxmlformats.org/officeDocument/2006/relationships" xmlns:p="http://schemas.openxmlformats.org/presentationml/2006/main">
   <p:cSld>
@@ -1976,6 +2364,254 @@
               <a:rPr lang="zh-CN" altLang="en-US"/>
               <a:t>弱一致性与最终一致性区别在于错误处理机制</a:t>
             </a:r>
+            <a:endParaRPr lang="zh-CN" altLang="en-US"/>
+          </a:p>
+        </p:txBody>
+      </p:sp>
+    </p:spTree>
+  </p:cSld>
+  <p:clrMapOvr>
+    <a:masterClrMapping/>
+  </p:clrMapOvr>
+</p:notes>
+</file>
+
+<file path=ppt/notesSlides/notesSlide40.xml><?xml version="1.0" encoding="utf-8"?>
+<p:notes xmlns:a="http://schemas.openxmlformats.org/drawingml/2006/main" xmlns:r="http://schemas.openxmlformats.org/officeDocument/2006/relationships" xmlns:p="http://schemas.openxmlformats.org/presentationml/2006/main">
+  <p:cSld>
+    <p:spTree>
+      <p:nvGrpSpPr>
+        <p:cNvPr id="1" name=""/>
+        <p:cNvGrpSpPr/>
+        <p:nvPr/>
+      </p:nvGrpSpPr>
+      <p:grpSpPr/>
+      <p:sp>
+        <p:nvSpPr>
+          <p:cNvPr id="2" name="幻灯片图像占位符 1"/>
+          <p:cNvSpPr/>
+          <p:nvPr>
+            <p:ph type="sldImg" idx="2"/>
+          </p:nvPr>
+        </p:nvSpPr>
+        <p:spPr/>
+      </p:sp>
+      <p:sp>
+        <p:nvSpPr>
+          <p:cNvPr id="3" name="文本占位符 2"/>
+          <p:cNvSpPr/>
+          <p:nvPr>
+            <p:ph type="body" idx="3"/>
+          </p:nvPr>
+        </p:nvSpPr>
+        <p:spPr/>
+        <p:txBody>
+          <a:bodyPr/>
+          <a:p>
+            <a:r>
+              <a:rPr lang="zh-CN" altLang="en-US"/>
+              <a:t>数据库自增序列： 需要分布式服务共用一个数据库</a:t>
+            </a:r>
+            <a:endParaRPr lang="zh-CN" altLang="en-US"/>
+          </a:p>
+          <a:p>
+            <a:r>
+              <a:rPr lang="en-US" altLang="zh-CN"/>
+              <a:t>UUID</a:t>
+            </a:r>
+            <a:r>
+              <a:rPr lang="zh-CN" altLang="en-US"/>
+              <a:t>： </a:t>
+            </a:r>
+            <a:r>
+              <a:rPr lang="en-US" altLang="zh-CN"/>
+              <a:t>128</a:t>
+            </a:r>
+            <a:r>
+              <a:rPr lang="zh-CN" altLang="en-US"/>
+              <a:t>位，</a:t>
+            </a:r>
+            <a:r>
+              <a:rPr lang="en-US" altLang="zh-CN"/>
+              <a:t>32</a:t>
+            </a:r>
+            <a:r>
+              <a:rPr lang="zh-CN" altLang="en-US"/>
+              <a:t>个</a:t>
+            </a:r>
+            <a:r>
+              <a:rPr lang="en-US" altLang="zh-CN"/>
+              <a:t>16</a:t>
+            </a:r>
+            <a:r>
+              <a:rPr lang="zh-CN" altLang="en-US"/>
+              <a:t>进制字符</a:t>
+            </a:r>
+            <a:endParaRPr lang="zh-CN" altLang="en-US"/>
+          </a:p>
+          <a:p>
+            <a:r>
+              <a:rPr lang="en-US" altLang="zh-CN"/>
+              <a:t>MongoDB</a:t>
+            </a:r>
+            <a:r>
+              <a:rPr lang="zh-CN" altLang="en-US"/>
+              <a:t>只保证系统中唯一，不保证全世界唯一。</a:t>
+            </a:r>
+            <a:r>
+              <a:rPr lang="en-US" altLang="zh-CN"/>
+              <a:t>24</a:t>
+            </a:r>
+            <a:r>
+              <a:rPr lang="zh-CN" altLang="en-US"/>
+              <a:t>个</a:t>
+            </a:r>
+            <a:r>
+              <a:rPr lang="en-US" altLang="zh-CN"/>
+              <a:t>16</a:t>
+            </a:r>
+            <a:r>
+              <a:rPr lang="zh-CN" altLang="en-US"/>
+              <a:t>进制字符</a:t>
+            </a:r>
+            <a:endParaRPr lang="zh-CN" altLang="en-US"/>
+          </a:p>
+          <a:p>
+            <a:r>
+              <a:rPr lang="en-US" altLang="zh-CN"/>
+              <a:t>Redis</a:t>
+            </a:r>
+            <a:r>
+              <a:rPr lang="zh-CN" altLang="en-US"/>
+              <a:t>、</a:t>
+            </a:r>
+            <a:r>
+              <a:rPr lang="en-US" altLang="zh-CN"/>
+              <a:t>Zookeeper:</a:t>
+            </a:r>
+            <a:endParaRPr lang="en-US" altLang="zh-CN"/>
+          </a:p>
+        </p:txBody>
+      </p:sp>
+    </p:spTree>
+  </p:cSld>
+  <p:clrMapOvr>
+    <a:masterClrMapping/>
+  </p:clrMapOvr>
+</p:notes>
+</file>
+
+<file path=ppt/notesSlides/notesSlide41.xml><?xml version="1.0" encoding="utf-8"?>
+<p:notes xmlns:a="http://schemas.openxmlformats.org/drawingml/2006/main" xmlns:r="http://schemas.openxmlformats.org/officeDocument/2006/relationships" xmlns:p="http://schemas.openxmlformats.org/presentationml/2006/main">
+  <p:cSld>
+    <p:spTree>
+      <p:nvGrpSpPr>
+        <p:cNvPr id="1" name=""/>
+        <p:cNvGrpSpPr/>
+        <p:nvPr/>
+      </p:nvGrpSpPr>
+      <p:grpSpPr/>
+      <p:sp>
+        <p:nvSpPr>
+          <p:cNvPr id="2" name="幻灯片图像占位符 1"/>
+          <p:cNvSpPr/>
+          <p:nvPr>
+            <p:ph type="sldImg" idx="2"/>
+          </p:nvPr>
+        </p:nvSpPr>
+        <p:spPr/>
+      </p:sp>
+      <p:sp>
+        <p:nvSpPr>
+          <p:cNvPr id="3" name="文本占位符 2"/>
+          <p:cNvSpPr/>
+          <p:nvPr>
+            <p:ph type="body" idx="3"/>
+          </p:nvPr>
+        </p:nvSpPr>
+        <p:spPr/>
+        <p:txBody>
+          <a:bodyPr/>
+          <a:p>
+            <a:r>
+              <a:rPr lang="zh-CN" altLang="en-US"/>
+              <a:t>自增</a:t>
+            </a:r>
+            <a:r>
+              <a:rPr lang="en-US" altLang="zh-CN"/>
+              <a:t>ID</a:t>
+            </a:r>
+            <a:r>
+              <a:rPr lang="zh-CN" altLang="en-US"/>
+              <a:t>的部署：所有的服务都需要访问一个数据库</a:t>
+            </a:r>
+            <a:endParaRPr lang="zh-CN" altLang="en-US"/>
+          </a:p>
+          <a:p>
+            <a:r>
+              <a:rPr lang="zh-CN" altLang="en-US"/>
+              <a:t>是否建索引：把</a:t>
+            </a:r>
+            <a:r>
+              <a:rPr lang="en-US" altLang="zh-CN"/>
+              <a:t>UUID</a:t>
+            </a:r>
+            <a:r>
+              <a:rPr lang="zh-CN" altLang="en-US"/>
+              <a:t>转成</a:t>
+            </a:r>
+            <a:r>
+              <a:rPr lang="en-US" altLang="zh-CN"/>
+              <a:t>Long</a:t>
+            </a:r>
+            <a:r>
+              <a:rPr lang="zh-CN" altLang="en-US"/>
+              <a:t>型保存建索引</a:t>
+            </a:r>
+            <a:endParaRPr lang="zh-CN" altLang="en-US"/>
+          </a:p>
+        </p:txBody>
+      </p:sp>
+    </p:spTree>
+  </p:cSld>
+  <p:clrMapOvr>
+    <a:masterClrMapping/>
+  </p:clrMapOvr>
+</p:notes>
+</file>
+
+<file path=ppt/notesSlides/notesSlide42.xml><?xml version="1.0" encoding="utf-8"?>
+<p:notes xmlns:a="http://schemas.openxmlformats.org/drawingml/2006/main" xmlns:r="http://schemas.openxmlformats.org/officeDocument/2006/relationships" xmlns:p="http://schemas.openxmlformats.org/presentationml/2006/main">
+  <p:cSld>
+    <p:spTree>
+      <p:nvGrpSpPr>
+        <p:cNvPr id="1" name=""/>
+        <p:cNvGrpSpPr/>
+        <p:nvPr/>
+      </p:nvGrpSpPr>
+      <p:grpSpPr/>
+      <p:sp>
+        <p:nvSpPr>
+          <p:cNvPr id="2" name="幻灯片图像占位符 1"/>
+          <p:cNvSpPr/>
+          <p:nvPr>
+            <p:ph type="sldImg" idx="2"/>
+          </p:nvPr>
+        </p:nvSpPr>
+        <p:spPr/>
+      </p:sp>
+      <p:sp>
+        <p:nvSpPr>
+          <p:cNvPr id="3" name="文本占位符 2"/>
+          <p:cNvSpPr/>
+          <p:nvPr>
+            <p:ph type="body" idx="3"/>
+          </p:nvPr>
+        </p:nvSpPr>
+        <p:spPr/>
+        <p:txBody>
+          <a:bodyPr/>
+          <a:p>
             <a:endParaRPr lang="zh-CN" altLang="en-US"/>
           </a:p>
         </p:txBody>
@@ -9131,11 +9767,7 @@
             </a:r>
             <a:r>
               <a:rPr lang="zh-CN" altLang="en-US"/>
-              <a:t>多数据源</a:t>
-            </a:r>
-            <a:r>
-              <a:rPr lang="zh-CN" altLang="en-US"/>
-              <a:t>事务管理</a:t>
+              <a:t>多数据源事务管理</a:t>
             </a:r>
             <a:endParaRPr lang="zh-CN" altLang="en-US"/>
           </a:p>
@@ -10525,6 +11157,10 @@
         <p:txBody>
           <a:bodyPr/>
           <a:p>
+            <a:r>
+              <a:rPr lang="zh-CN" altLang="en-US"/>
+              <a:t>分布式事务实现的模式与技术</a:t>
+            </a:r>
             <a:endParaRPr lang="zh-CN" altLang="en-US"/>
           </a:p>
         </p:txBody>
@@ -10544,37 +11180,149 @@
           <a:bodyPr/>
           <a:p>
             <a:r>
-              <a:rPr lang="zh-CN" altLang="en-US"/>
-              <a:t>https://www.2cto.com/kf/201803/728799.html</a:t>
-            </a:r>
-            <a:endParaRPr lang="zh-CN" altLang="en-US"/>
-          </a:p>
-          <a:p>
-            <a:r>
-              <a:rPr lang="zh-CN" altLang="en-US"/>
-              <a:t>配合spring-tx实现事务的原理</a:t>
-            </a:r>
-            <a:endParaRPr lang="zh-CN" altLang="en-US"/>
-          </a:p>
-          <a:p>
-            <a:endParaRPr lang="zh-CN" altLang="en-US"/>
-          </a:p>
-          <a:p>
-            <a:r>
-              <a:rPr lang="zh-CN" altLang="en-US"/>
-              <a:t>https://blog.csdn.net/weixin_42861564/article/details/81590093</a:t>
-            </a:r>
-            <a:endParaRPr lang="zh-CN" altLang="en-US"/>
-          </a:p>
-          <a:p>
+              <a:rPr lang="zh-CN" altLang="en-US">
+                <a:sym typeface="+mn-ea"/>
+              </a:rPr>
+              <a:t>分布式事务实现的几种模式</a:t>
+            </a:r>
+            <a:endParaRPr lang="zh-CN" altLang="en-US">
+              <a:sym typeface="+mn-ea"/>
+            </a:endParaRPr>
+          </a:p>
+          <a:p>
+            <a:endParaRPr lang="zh-CN" altLang="en-US"/>
+          </a:p>
+          <a:p>
+            <a:r>
+              <a:rPr lang="zh-CN" altLang="en-US">
+                <a:sym typeface="+mn-ea"/>
+              </a:rPr>
+              <a:t>幂等性，唯一性</a:t>
+            </a:r>
+            <a:r>
+              <a:rPr lang="en-US" altLang="zh-CN">
+                <a:sym typeface="+mn-ea"/>
+              </a:rPr>
+              <a:t>ID</a:t>
+            </a:r>
+            <a:endParaRPr lang="en-US" altLang="zh-CN">
+              <a:sym typeface="+mn-ea"/>
+            </a:endParaRPr>
+          </a:p>
+          <a:p>
+            <a:endParaRPr lang="en-US" altLang="zh-CN"/>
+          </a:p>
+          <a:p>
+            <a:r>
+              <a:rPr lang="zh-CN" altLang="en-US">
+                <a:sym typeface="+mn-ea"/>
+              </a:rPr>
+              <a:t>分布式锁与对象</a:t>
+            </a:r>
+            <a:endParaRPr lang="zh-CN" altLang="en-US"/>
+          </a:p>
+        </p:txBody>
+      </p:sp>
+    </p:spTree>
+    <p:custDataLst>
+      <p:tags r:id="rId1"/>
+    </p:custDataLst>
+  </p:cSld>
+  <p:clrMapOvr>
+    <a:masterClrMapping/>
+  </p:clrMapOvr>
+</p:sld>
+</file>
+
+<file path=ppt/slides/slide39.xml><?xml version="1.0" encoding="utf-8"?>
+<p:sld xmlns:a="http://schemas.openxmlformats.org/drawingml/2006/main" xmlns:r="http://schemas.openxmlformats.org/officeDocument/2006/relationships" xmlns:p="http://schemas.openxmlformats.org/presentationml/2006/main">
+  <p:cSld>
+    <p:spTree>
+      <p:nvGrpSpPr>
+        <p:cNvPr id="1" name=""/>
+        <p:cNvGrpSpPr/>
+        <p:nvPr/>
+      </p:nvGrpSpPr>
+      <p:grpSpPr/>
+      <p:sp>
+        <p:nvSpPr>
+          <p:cNvPr id="2" name="标题 1"/>
+          <p:cNvSpPr>
+            <a:spLocks noGrp="1"/>
+          </p:cNvSpPr>
+          <p:nvPr>
+            <p:ph type="title"/>
+          </p:nvPr>
+        </p:nvSpPr>
+        <p:spPr/>
+        <p:txBody>
+          <a:bodyPr/>
+          <a:p>
+            <a:r>
+              <a:rPr lang="zh-CN" altLang="en-US"/>
+              <a:t>分布式事务的几种模式</a:t>
+            </a:r>
+            <a:endParaRPr lang="zh-CN" altLang="en-US"/>
+          </a:p>
+        </p:txBody>
+      </p:sp>
+      <p:sp>
+        <p:nvSpPr>
+          <p:cNvPr id="3" name="内容占位符 2"/>
+          <p:cNvSpPr>
+            <a:spLocks noGrp="1"/>
+          </p:cNvSpPr>
+          <p:nvPr>
+            <p:ph idx="1"/>
+          </p:nvPr>
+        </p:nvSpPr>
+        <p:spPr/>
+        <p:txBody>
+          <a:bodyPr/>
+          <a:p>
+            <a:r>
+              <a:rPr lang="zh-CN" altLang="en-US"/>
+              <a:t>消息驱动模式 </a:t>
+            </a:r>
             <a:r>
               <a:rPr lang="en-US" altLang="zh-CN"/>
-              <a:t>Spring</a:t>
-            </a:r>
-            <a:r>
-              <a:rPr lang="zh-CN" altLang="en-US"/>
-              <a:t>事务同步</a:t>
-            </a:r>
+              <a:t>Message Driven</a:t>
+            </a:r>
+            <a:endParaRPr lang="en-US" altLang="zh-CN"/>
+          </a:p>
+          <a:p>
+            <a:endParaRPr lang="en-US" altLang="zh-CN"/>
+          </a:p>
+          <a:p>
+            <a:r>
+              <a:rPr lang="zh-CN" altLang="en-US"/>
+              <a:t>事件溯源模式 </a:t>
+            </a:r>
+            <a:r>
+              <a:rPr lang="en-US" altLang="zh-CN"/>
+              <a:t>Event Sourcing</a:t>
+            </a:r>
+            <a:endParaRPr lang="en-US" altLang="zh-CN"/>
+          </a:p>
+          <a:p>
+            <a:endParaRPr lang="en-US" altLang="zh-CN"/>
+          </a:p>
+          <a:p>
+            <a:r>
+              <a:rPr lang="en-US" altLang="zh-CN"/>
+              <a:t>TCC</a:t>
+            </a:r>
+            <a:r>
+              <a:rPr lang="zh-CN" altLang="en-US"/>
+              <a:t>模式 </a:t>
+            </a:r>
+            <a:r>
+              <a:rPr lang="en-US" altLang="zh-CN"/>
+              <a:t>Try-Confirm-Cancel</a:t>
+            </a:r>
+            <a:endParaRPr lang="zh-CN" altLang="en-US"/>
+          </a:p>
+          <a:p>
             <a:endParaRPr lang="zh-CN" altLang="en-US"/>
           </a:p>
         </p:txBody>
@@ -10675,6 +11423,1001 @@
             <a:r>
               <a:rPr lang="zh-CN" altLang="en-US"/>
               <a:t>分区容错性</a:t>
+            </a:r>
+            <a:endParaRPr lang="zh-CN" altLang="en-US"/>
+          </a:p>
+        </p:txBody>
+      </p:sp>
+    </p:spTree>
+    <p:custDataLst>
+      <p:tags r:id="rId1"/>
+    </p:custDataLst>
+  </p:cSld>
+  <p:clrMapOvr>
+    <a:masterClrMapping/>
+  </p:clrMapOvr>
+</p:sld>
+</file>
+
+<file path=ppt/slides/slide40.xml><?xml version="1.0" encoding="utf-8"?>
+<p:sld xmlns:a="http://schemas.openxmlformats.org/drawingml/2006/main" xmlns:r="http://schemas.openxmlformats.org/officeDocument/2006/relationships" xmlns:p="http://schemas.openxmlformats.org/presentationml/2006/main">
+  <p:cSld>
+    <p:spTree>
+      <p:nvGrpSpPr>
+        <p:cNvPr id="1" name=""/>
+        <p:cNvGrpSpPr/>
+        <p:nvPr/>
+      </p:nvGrpSpPr>
+      <p:grpSpPr/>
+      <p:sp>
+        <p:nvSpPr>
+          <p:cNvPr id="2" name="标题 1"/>
+          <p:cNvSpPr>
+            <a:spLocks noGrp="1"/>
+          </p:cNvSpPr>
+          <p:nvPr>
+            <p:ph type="title"/>
+          </p:nvPr>
+        </p:nvSpPr>
+        <p:spPr/>
+        <p:txBody>
+          <a:bodyPr/>
+          <a:p>
+            <a:r>
+              <a:rPr lang="zh-CN" altLang="en-US"/>
+              <a:t>分布式事务的性质</a:t>
+            </a:r>
+            <a:endParaRPr lang="zh-CN" altLang="en-US"/>
+          </a:p>
+        </p:txBody>
+      </p:sp>
+      <p:sp>
+        <p:nvSpPr>
+          <p:cNvPr id="3" name="内容占位符 2"/>
+          <p:cNvSpPr>
+            <a:spLocks noGrp="1"/>
+          </p:cNvSpPr>
+          <p:nvPr>
+            <p:ph idx="1"/>
+          </p:nvPr>
+        </p:nvSpPr>
+        <p:spPr/>
+        <p:txBody>
+          <a:bodyPr/>
+          <a:p>
+            <a:r>
+              <a:rPr lang="zh-CN" altLang="en-US"/>
+              <a:t>幂等性：</a:t>
+            </a:r>
+            <a:endParaRPr lang="zh-CN" altLang="en-US"/>
+          </a:p>
+          <a:p>
+            <a:endParaRPr lang="zh-CN" altLang="en-US"/>
+          </a:p>
+          <a:p>
+            <a:pPr lvl="1"/>
+            <a:r>
+              <a:rPr lang="zh-CN" altLang="en-US"/>
+              <a:t>幂等操作：任意多次操作与一次操作执行的影响是一样的</a:t>
+            </a:r>
+            <a:endParaRPr lang="zh-CN" altLang="en-US"/>
+          </a:p>
+          <a:p>
+            <a:pPr lvl="1"/>
+            <a:endParaRPr lang="zh-CN" altLang="en-US"/>
+          </a:p>
+          <a:p>
+            <a:pPr lvl="1"/>
+            <a:r>
+              <a:rPr lang="zh-CN" altLang="en-US"/>
+              <a:t>方法的幂等性：使用样的参数调用多次与一次结果相同</a:t>
+            </a:r>
+            <a:endParaRPr lang="zh-CN" altLang="en-US"/>
+          </a:p>
+          <a:p>
+            <a:pPr lvl="1"/>
+            <a:endParaRPr lang="zh-CN" altLang="en-US"/>
+          </a:p>
+          <a:p>
+            <a:pPr lvl="1"/>
+            <a:r>
+              <a:rPr lang="zh-CN" altLang="en-US"/>
+              <a:t>接口的幂等性：接口使用同样的参数被重复调用，结果一致</a:t>
+            </a:r>
+            <a:endParaRPr lang="zh-CN" altLang="en-US"/>
+          </a:p>
+          <a:p>
+            <a:endParaRPr lang="zh-CN" altLang="en-US"/>
+          </a:p>
+        </p:txBody>
+      </p:sp>
+    </p:spTree>
+    <p:custDataLst>
+      <p:tags r:id="rId1"/>
+    </p:custDataLst>
+  </p:cSld>
+  <p:clrMapOvr>
+    <a:masterClrMapping/>
+  </p:clrMapOvr>
+</p:sld>
+</file>
+
+<file path=ppt/slides/slide41.xml><?xml version="1.0" encoding="utf-8"?>
+<p:sld xmlns:a="http://schemas.openxmlformats.org/drawingml/2006/main" xmlns:r="http://schemas.openxmlformats.org/officeDocument/2006/relationships" xmlns:p="http://schemas.openxmlformats.org/presentationml/2006/main">
+  <p:cSld>
+    <p:spTree>
+      <p:nvGrpSpPr>
+        <p:cNvPr id="1" name=""/>
+        <p:cNvGrpSpPr/>
+        <p:nvPr/>
+      </p:nvGrpSpPr>
+      <p:grpSpPr/>
+      <p:sp>
+        <p:nvSpPr>
+          <p:cNvPr id="2" name="标题 1"/>
+          <p:cNvSpPr>
+            <a:spLocks noGrp="1"/>
+          </p:cNvSpPr>
+          <p:nvPr>
+            <p:ph type="title"/>
+          </p:nvPr>
+        </p:nvSpPr>
+        <p:spPr/>
+        <p:txBody>
+          <a:bodyPr/>
+          <a:p>
+            <a:r>
+              <a:rPr lang="zh-CN" altLang="en-US"/>
+              <a:t>微服务接口的幂等性</a:t>
+            </a:r>
+            <a:endParaRPr lang="zh-CN" altLang="en-US"/>
+          </a:p>
+        </p:txBody>
+      </p:sp>
+      <p:sp>
+        <p:nvSpPr>
+          <p:cNvPr id="3" name="内容占位符 2"/>
+          <p:cNvSpPr>
+            <a:spLocks noGrp="1"/>
+          </p:cNvSpPr>
+          <p:nvPr>
+            <p:ph idx="1"/>
+          </p:nvPr>
+        </p:nvSpPr>
+        <p:spPr/>
+        <p:txBody>
+          <a:bodyPr/>
+          <a:p>
+            <a:r>
+              <a:rPr lang="zh-CN" altLang="en-US"/>
+              <a:t>重要性：经常需要通过重试实现分布式事务的一致性</a:t>
+            </a:r>
+            <a:endParaRPr lang="zh-CN" altLang="en-US"/>
+          </a:p>
+          <a:p>
+            <a:endParaRPr lang="zh-CN" altLang="en-US"/>
+          </a:p>
+          <a:p>
+            <a:r>
+              <a:rPr lang="en-US" altLang="zh-CN"/>
+              <a:t>GET</a:t>
+            </a:r>
+            <a:r>
+              <a:rPr lang="zh-CN" altLang="en-US"/>
+              <a:t>方法不会对系统产生副作用，具有幂等性</a:t>
+            </a:r>
+            <a:endParaRPr lang="zh-CN" altLang="en-US"/>
+          </a:p>
+          <a:p>
+            <a:endParaRPr lang="zh-CN" altLang="en-US"/>
+          </a:p>
+          <a:p>
+            <a:r>
+              <a:rPr lang="en-US" altLang="zh-CN"/>
+              <a:t>POST</a:t>
+            </a:r>
+            <a:r>
+              <a:rPr lang="zh-CN" altLang="en-US"/>
+              <a:t>、</a:t>
+            </a:r>
+            <a:r>
+              <a:rPr lang="en-US" altLang="zh-CN"/>
+              <a:t>PUT</a:t>
+            </a:r>
+            <a:r>
+              <a:rPr lang="zh-CN" altLang="en-US"/>
+              <a:t>、</a:t>
+            </a:r>
+            <a:r>
+              <a:rPr lang="en-US" altLang="zh-CN"/>
+              <a:t>DELETE</a:t>
+            </a:r>
+            <a:r>
+              <a:rPr lang="zh-CN" altLang="en-US"/>
+              <a:t>方法实现需要满足幂等性</a:t>
+            </a:r>
+            <a:endParaRPr lang="zh-CN" altLang="en-US"/>
+          </a:p>
+        </p:txBody>
+      </p:sp>
+    </p:spTree>
+    <p:custDataLst>
+      <p:tags r:id="rId1"/>
+    </p:custDataLst>
+  </p:cSld>
+  <p:clrMapOvr>
+    <a:masterClrMapping/>
+  </p:clrMapOvr>
+</p:sld>
+</file>
+
+<file path=ppt/slides/slide42.xml><?xml version="1.0" encoding="utf-8"?>
+<p:sld xmlns:a="http://schemas.openxmlformats.org/drawingml/2006/main" xmlns:r="http://schemas.openxmlformats.org/officeDocument/2006/relationships" xmlns:p="http://schemas.openxmlformats.org/presentationml/2006/main">
+  <p:cSld>
+    <p:spTree>
+      <p:nvGrpSpPr>
+        <p:cNvPr id="1" name=""/>
+        <p:cNvGrpSpPr/>
+        <p:nvPr/>
+      </p:nvGrpSpPr>
+      <p:grpSpPr/>
+      <p:sp>
+        <p:nvSpPr>
+          <p:cNvPr id="2" name="标题 1"/>
+          <p:cNvSpPr>
+            <a:spLocks noGrp="1"/>
+          </p:cNvSpPr>
+          <p:nvPr>
+            <p:ph type="title"/>
+          </p:nvPr>
+        </p:nvSpPr>
+        <p:spPr/>
+        <p:txBody>
+          <a:bodyPr/>
+          <a:p>
+            <a:r>
+              <a:rPr lang="zh-CN" altLang="en-US"/>
+              <a:t>幂等性实现</a:t>
+            </a:r>
+            <a:endParaRPr lang="zh-CN" altLang="en-US"/>
+          </a:p>
+        </p:txBody>
+      </p:sp>
+      <p:pic>
+        <p:nvPicPr>
+          <p:cNvPr id="4" name="内容占位符 3"/>
+          <p:cNvPicPr>
+            <a:picLocks noChangeAspect="1"/>
+          </p:cNvPicPr>
+          <p:nvPr>
+            <p:ph idx="1"/>
+          </p:nvPr>
+        </p:nvPicPr>
+        <p:blipFill>
+          <a:blip r:embed="rId1"/>
+          <a:stretch>
+            <a:fillRect/>
+          </a:stretch>
+        </p:blipFill>
+        <p:spPr>
+          <a:xfrm>
+            <a:off x="876300" y="1916430"/>
+            <a:ext cx="10440035" cy="4190365"/>
+          </a:xfrm>
+          <a:prstGeom prst="rect">
+            <a:avLst/>
+          </a:prstGeom>
+        </p:spPr>
+      </p:pic>
+    </p:spTree>
+    <p:custDataLst>
+      <p:tags r:id="rId2"/>
+    </p:custDataLst>
+  </p:cSld>
+  <p:clrMapOvr>
+    <a:masterClrMapping/>
+  </p:clrMapOvr>
+</p:sld>
+</file>
+
+<file path=ppt/slides/slide43.xml><?xml version="1.0" encoding="utf-8"?>
+<p:sld xmlns:a="http://schemas.openxmlformats.org/drawingml/2006/main" xmlns:r="http://schemas.openxmlformats.org/officeDocument/2006/relationships" xmlns:p="http://schemas.openxmlformats.org/presentationml/2006/main">
+  <p:cSld>
+    <p:spTree>
+      <p:nvGrpSpPr>
+        <p:cNvPr id="1" name=""/>
+        <p:cNvGrpSpPr/>
+        <p:nvPr/>
+      </p:nvGrpSpPr>
+      <p:grpSpPr/>
+      <p:sp>
+        <p:nvSpPr>
+          <p:cNvPr id="2" name="标题 1"/>
+          <p:cNvSpPr>
+            <a:spLocks noGrp="1"/>
+          </p:cNvSpPr>
+          <p:nvPr>
+            <p:ph type="title"/>
+          </p:nvPr>
+        </p:nvSpPr>
+        <p:spPr/>
+        <p:txBody>
+          <a:bodyPr/>
+          <a:p>
+            <a:r>
+              <a:rPr lang="zh-CN" altLang="en-US"/>
+              <a:t>幂等性实现</a:t>
+            </a:r>
+            <a:endParaRPr lang="zh-CN" altLang="en-US"/>
+          </a:p>
+        </p:txBody>
+      </p:sp>
+      <p:pic>
+        <p:nvPicPr>
+          <p:cNvPr id="4" name="内容占位符 3"/>
+          <p:cNvPicPr>
+            <a:picLocks noChangeAspect="1"/>
+          </p:cNvPicPr>
+          <p:nvPr>
+            <p:ph idx="1"/>
+          </p:nvPr>
+        </p:nvPicPr>
+        <p:blipFill>
+          <a:blip r:embed="rId1"/>
+          <a:stretch>
+            <a:fillRect/>
+          </a:stretch>
+        </p:blipFill>
+        <p:spPr>
+          <a:xfrm>
+            <a:off x="876300" y="2835910"/>
+            <a:ext cx="10440035" cy="2352040"/>
+          </a:xfrm>
+          <a:prstGeom prst="rect">
+            <a:avLst/>
+          </a:prstGeom>
+        </p:spPr>
+      </p:pic>
+    </p:spTree>
+    <p:custDataLst>
+      <p:tags r:id="rId2"/>
+    </p:custDataLst>
+  </p:cSld>
+  <p:clrMapOvr>
+    <a:masterClrMapping/>
+  </p:clrMapOvr>
+</p:sld>
+</file>
+
+<file path=ppt/slides/slide44.xml><?xml version="1.0" encoding="utf-8"?>
+<p:sld xmlns:a="http://schemas.openxmlformats.org/drawingml/2006/main" xmlns:r="http://schemas.openxmlformats.org/officeDocument/2006/relationships" xmlns:p="http://schemas.openxmlformats.org/presentationml/2006/main">
+  <p:cSld>
+    <p:spTree>
+      <p:nvGrpSpPr>
+        <p:cNvPr id="1" name=""/>
+        <p:cNvGrpSpPr/>
+        <p:nvPr/>
+      </p:nvGrpSpPr>
+      <p:grpSpPr/>
+      <p:sp>
+        <p:nvSpPr>
+          <p:cNvPr id="2" name="标题 1"/>
+          <p:cNvSpPr>
+            <a:spLocks noGrp="1"/>
+          </p:cNvSpPr>
+          <p:nvPr>
+            <p:ph type="title"/>
+          </p:nvPr>
+        </p:nvSpPr>
+        <p:spPr/>
+        <p:txBody>
+          <a:bodyPr/>
+          <a:p>
+            <a:r>
+              <a:rPr lang="zh-CN" altLang="en-US"/>
+              <a:t>分布式系统唯一性</a:t>
+            </a:r>
+            <a:r>
+              <a:rPr lang="en-US" altLang="zh-CN"/>
+              <a:t>ID </a:t>
+            </a:r>
+            <a:r>
+              <a:rPr lang="zh-CN" altLang="en-US"/>
+              <a:t>：</a:t>
+            </a:r>
+            <a:r>
+              <a:rPr lang="en-US" altLang="zh-CN"/>
+              <a:t>GUID</a:t>
+            </a:r>
+            <a:endParaRPr lang="en-US" altLang="zh-CN"/>
+          </a:p>
+        </p:txBody>
+      </p:sp>
+      <p:sp>
+        <p:nvSpPr>
+          <p:cNvPr id="3" name="内容占位符 2"/>
+          <p:cNvSpPr>
+            <a:spLocks noGrp="1"/>
+          </p:cNvSpPr>
+          <p:nvPr>
+            <p:ph idx="1"/>
+          </p:nvPr>
+        </p:nvSpPr>
+        <p:spPr/>
+        <p:txBody>
+          <a:bodyPr/>
+          <a:p>
+            <a:r>
+              <a:rPr lang="zh-CN" altLang="en-US"/>
+              <a:t>分布式系统的全局唯一标识</a:t>
+            </a:r>
+            <a:endParaRPr lang="zh-CN" altLang="en-US"/>
+          </a:p>
+          <a:p>
+            <a:endParaRPr lang="zh-CN" altLang="en-US"/>
+          </a:p>
+          <a:p>
+            <a:r>
+              <a:rPr lang="en-US" altLang="zh-CN"/>
+              <a:t>UUID</a:t>
+            </a:r>
+            <a:r>
+              <a:rPr lang="zh-CN" altLang="en-US"/>
+              <a:t>： 生成</a:t>
+            </a:r>
+            <a:r>
+              <a:rPr lang="en-US" altLang="zh-CN"/>
+              <a:t>ID</a:t>
+            </a:r>
+            <a:r>
+              <a:rPr lang="zh-CN" altLang="en-US"/>
+              <a:t>的规范</a:t>
+            </a:r>
+            <a:endParaRPr lang="zh-CN" altLang="en-US"/>
+          </a:p>
+          <a:p>
+            <a:endParaRPr lang="zh-CN" altLang="en-US"/>
+          </a:p>
+          <a:p>
+            <a:r>
+              <a:rPr lang="zh-CN" altLang="en-US"/>
+              <a:t>用于唯一标识，处理重复消息</a:t>
+            </a:r>
+            <a:endParaRPr lang="zh-CN" altLang="en-US"/>
+          </a:p>
+        </p:txBody>
+      </p:sp>
+    </p:spTree>
+    <p:custDataLst>
+      <p:tags r:id="rId1"/>
+    </p:custDataLst>
+  </p:cSld>
+  <p:clrMapOvr>
+    <a:masterClrMapping/>
+  </p:clrMapOvr>
+</p:sld>
+</file>
+
+<file path=ppt/slides/slide45.xml><?xml version="1.0" encoding="utf-8"?>
+<p:sld xmlns:a="http://schemas.openxmlformats.org/drawingml/2006/main" xmlns:r="http://schemas.openxmlformats.org/officeDocument/2006/relationships" xmlns:p="http://schemas.openxmlformats.org/presentationml/2006/main">
+  <p:cSld>
+    <p:spTree>
+      <p:nvGrpSpPr>
+        <p:cNvPr id="1" name=""/>
+        <p:cNvGrpSpPr/>
+        <p:nvPr/>
+      </p:nvGrpSpPr>
+      <p:grpSpPr/>
+      <p:sp>
+        <p:nvSpPr>
+          <p:cNvPr id="2" name="标题 1"/>
+          <p:cNvSpPr>
+            <a:spLocks noGrp="1"/>
+          </p:cNvSpPr>
+          <p:nvPr>
+            <p:ph type="title"/>
+          </p:nvPr>
+        </p:nvSpPr>
+        <p:spPr/>
+        <p:txBody>
+          <a:bodyPr/>
+          <a:p>
+            <a:r>
+              <a:rPr lang="zh-CN" altLang="en-US"/>
+              <a:t>分布式系统唯一</a:t>
+            </a:r>
+            <a:r>
+              <a:rPr lang="en-US" altLang="zh-CN"/>
+              <a:t>ID</a:t>
+            </a:r>
+            <a:r>
+              <a:rPr lang="zh-CN" altLang="en-US"/>
+              <a:t>的生成</a:t>
+            </a:r>
+            <a:endParaRPr lang="zh-CN" altLang="en-US"/>
+          </a:p>
+        </p:txBody>
+      </p:sp>
+      <p:sp>
+        <p:nvSpPr>
+          <p:cNvPr id="3" name="内容占位符 2"/>
+          <p:cNvSpPr>
+            <a:spLocks noGrp="1"/>
+          </p:cNvSpPr>
+          <p:nvPr>
+            <p:ph idx="1"/>
+          </p:nvPr>
+        </p:nvSpPr>
+        <p:spPr/>
+        <p:txBody>
+          <a:bodyPr/>
+          <a:p>
+            <a:r>
+              <a:rPr lang="zh-CN" altLang="en-US"/>
+              <a:t>数据库自增序列</a:t>
+            </a:r>
+            <a:endParaRPr lang="zh-CN" altLang="en-US"/>
+          </a:p>
+          <a:p>
+            <a:endParaRPr lang="zh-CN" altLang="en-US"/>
+          </a:p>
+          <a:p>
+            <a:r>
+              <a:rPr lang="en-US" altLang="zh-CN"/>
+              <a:t>UUID</a:t>
+            </a:r>
+            <a:r>
+              <a:rPr lang="zh-CN" altLang="en-US"/>
+              <a:t>： 唯一</a:t>
+            </a:r>
+            <a:r>
+              <a:rPr lang="en-US" altLang="zh-CN"/>
+              <a:t>ID</a:t>
+            </a:r>
+            <a:r>
+              <a:rPr lang="zh-CN" altLang="en-US"/>
+              <a:t>标准，</a:t>
+            </a:r>
+            <a:r>
+              <a:rPr lang="en-US" altLang="zh-CN"/>
+              <a:t>128</a:t>
+            </a:r>
+            <a:r>
+              <a:rPr lang="zh-CN" altLang="en-US"/>
+              <a:t>位，几种版本</a:t>
+            </a:r>
+            <a:endParaRPr lang="zh-CN" altLang="en-US"/>
+          </a:p>
+          <a:p>
+            <a:endParaRPr lang="zh-CN" altLang="en-US"/>
+          </a:p>
+          <a:p>
+            <a:r>
+              <a:rPr lang="zh-CN" altLang="en-US"/>
+              <a:t>参考</a:t>
+            </a:r>
+            <a:r>
+              <a:rPr lang="en-US" altLang="zh-CN"/>
+              <a:t>MongoDB</a:t>
+            </a:r>
+            <a:r>
+              <a:rPr lang="zh-CN" altLang="en-US"/>
+              <a:t>的</a:t>
+            </a:r>
+            <a:r>
+              <a:rPr lang="en-US" altLang="zh-CN"/>
+              <a:t>ObjectID</a:t>
+            </a:r>
+            <a:r>
+              <a:rPr lang="zh-CN" altLang="en-US"/>
+              <a:t>：时间戳</a:t>
+            </a:r>
+            <a:r>
+              <a:rPr lang="en-US" altLang="zh-CN"/>
+              <a:t>+</a:t>
+            </a:r>
+            <a:r>
+              <a:rPr lang="zh-CN" altLang="en-US"/>
+              <a:t>机器</a:t>
+            </a:r>
+            <a:r>
+              <a:rPr lang="en-US" altLang="zh-CN"/>
+              <a:t>ID+</a:t>
+            </a:r>
+            <a:r>
+              <a:rPr lang="zh-CN" altLang="en-US"/>
+              <a:t>进程</a:t>
+            </a:r>
+            <a:r>
+              <a:rPr lang="en-US" altLang="zh-CN"/>
+              <a:t>ID+</a:t>
+            </a:r>
+            <a:r>
+              <a:rPr lang="zh-CN" altLang="en-US"/>
+              <a:t>序号</a:t>
+            </a:r>
+            <a:endParaRPr lang="zh-CN" altLang="en-US"/>
+          </a:p>
+          <a:p>
+            <a:endParaRPr lang="zh-CN" altLang="en-US"/>
+          </a:p>
+          <a:p>
+            <a:r>
+              <a:rPr lang="zh-CN" altLang="en-US"/>
+              <a:t>分布式的第三方服务如：</a:t>
+            </a:r>
+            <a:r>
+              <a:rPr lang="en-US" altLang="zh-CN"/>
+              <a:t>Redis</a:t>
+            </a:r>
+            <a:r>
+              <a:rPr lang="zh-CN" altLang="en-US"/>
+              <a:t>的</a:t>
+            </a:r>
+            <a:r>
+              <a:rPr lang="en-US" altLang="zh-CN"/>
+              <a:t>INCR</a:t>
+            </a:r>
+            <a:r>
+              <a:rPr lang="zh-CN" altLang="en-US"/>
+              <a:t>操作、</a:t>
+            </a:r>
+            <a:r>
+              <a:rPr lang="en-US" altLang="zh-CN"/>
+              <a:t>Zookeeper</a:t>
+            </a:r>
+            <a:r>
+              <a:rPr lang="zh-CN" altLang="en-US"/>
+              <a:t>节点的版本号</a:t>
+            </a:r>
+            <a:endParaRPr lang="zh-CN" altLang="en-US"/>
+          </a:p>
+          <a:p>
+            <a:endParaRPr lang="zh-CN" altLang="en-US"/>
+          </a:p>
+          <a:p>
+            <a:endParaRPr lang="zh-CN" altLang="en-US"/>
+          </a:p>
+        </p:txBody>
+      </p:sp>
+    </p:spTree>
+    <p:custDataLst>
+      <p:tags r:id="rId1"/>
+    </p:custDataLst>
+  </p:cSld>
+  <p:clrMapOvr>
+    <a:masterClrMapping/>
+  </p:clrMapOvr>
+</p:sld>
+</file>
+
+<file path=ppt/slides/slide46.xml><?xml version="1.0" encoding="utf-8"?>
+<p:sld xmlns:a="http://schemas.openxmlformats.org/drawingml/2006/main" xmlns:r="http://schemas.openxmlformats.org/officeDocument/2006/relationships" xmlns:p="http://schemas.openxmlformats.org/presentationml/2006/main">
+  <p:cSld>
+    <p:spTree>
+      <p:nvGrpSpPr>
+        <p:cNvPr id="1" name=""/>
+        <p:cNvGrpSpPr/>
+        <p:nvPr/>
+      </p:nvGrpSpPr>
+      <p:grpSpPr/>
+      <p:sp>
+        <p:nvSpPr>
+          <p:cNvPr id="2" name="标题 1"/>
+          <p:cNvSpPr>
+            <a:spLocks noGrp="1"/>
+          </p:cNvSpPr>
+          <p:nvPr>
+            <p:ph type="title"/>
+          </p:nvPr>
+        </p:nvSpPr>
+        <p:spPr/>
+        <p:txBody>
+          <a:bodyPr/>
+          <a:p>
+            <a:r>
+              <a:rPr lang="zh-CN" altLang="en-US"/>
+              <a:t>唯一</a:t>
+            </a:r>
+            <a:r>
+              <a:rPr lang="en-US" altLang="zh-CN"/>
+              <a:t>ID</a:t>
+            </a:r>
+            <a:r>
+              <a:rPr lang="zh-CN" altLang="en-US"/>
+              <a:t>生成方式的选择</a:t>
+            </a:r>
+            <a:endParaRPr lang="zh-CN" altLang="en-US"/>
+          </a:p>
+        </p:txBody>
+      </p:sp>
+      <p:sp>
+        <p:nvSpPr>
+          <p:cNvPr id="3" name="内容占位符 2"/>
+          <p:cNvSpPr>
+            <a:spLocks noGrp="1"/>
+          </p:cNvSpPr>
+          <p:nvPr>
+            <p:ph idx="1"/>
+          </p:nvPr>
+        </p:nvSpPr>
+        <p:spPr/>
+        <p:txBody>
+          <a:bodyPr/>
+          <a:p>
+            <a:r>
+              <a:rPr lang="zh-CN" altLang="en-US"/>
+              <a:t>自增的</a:t>
+            </a:r>
+            <a:r>
+              <a:rPr lang="en-US" altLang="zh-CN"/>
+              <a:t>ID</a:t>
+            </a:r>
+            <a:r>
+              <a:rPr lang="zh-CN" altLang="en-US"/>
+              <a:t>：考虑安全性、部署</a:t>
+            </a:r>
+            <a:endParaRPr lang="zh-CN" altLang="en-US"/>
+          </a:p>
+          <a:p>
+            <a:endParaRPr lang="zh-CN" altLang="en-US"/>
+          </a:p>
+          <a:p>
+            <a:r>
+              <a:rPr lang="zh-CN" altLang="en-US"/>
+              <a:t>时间有序：便于通过</a:t>
+            </a:r>
+            <a:r>
+              <a:rPr lang="en-US" altLang="zh-CN"/>
+              <a:t>ID</a:t>
+            </a:r>
+            <a:r>
+              <a:rPr lang="zh-CN" altLang="en-US"/>
+              <a:t>判断创建时间</a:t>
+            </a:r>
+            <a:endParaRPr lang="zh-CN" altLang="en-US"/>
+          </a:p>
+          <a:p>
+            <a:endParaRPr lang="zh-CN" altLang="en-US"/>
+          </a:p>
+          <a:p>
+            <a:r>
+              <a:rPr lang="zh-CN" altLang="en-US"/>
+              <a:t>长度、是否数字类型：是否建索引</a:t>
+            </a:r>
+            <a:endParaRPr lang="en-US" altLang="zh-CN"/>
+          </a:p>
+          <a:p>
+            <a:endParaRPr lang="en-US" altLang="zh-CN"/>
+          </a:p>
+        </p:txBody>
+      </p:sp>
+    </p:spTree>
+    <p:custDataLst>
+      <p:tags r:id="rId1"/>
+    </p:custDataLst>
+  </p:cSld>
+  <p:clrMapOvr>
+    <a:masterClrMapping/>
+  </p:clrMapOvr>
+</p:sld>
+</file>
+
+<file path=ppt/slides/slide47.xml><?xml version="1.0" encoding="utf-8"?>
+<p:sld xmlns:a="http://schemas.openxmlformats.org/drawingml/2006/main" xmlns:r="http://schemas.openxmlformats.org/officeDocument/2006/relationships" xmlns:p="http://schemas.openxmlformats.org/presentationml/2006/main">
+  <p:cSld>
+    <p:spTree>
+      <p:nvGrpSpPr>
+        <p:cNvPr id="1" name=""/>
+        <p:cNvGrpSpPr/>
+        <p:nvPr/>
+      </p:nvGrpSpPr>
+      <p:grpSpPr/>
+      <p:sp>
+        <p:nvSpPr>
+          <p:cNvPr id="2" name="标题 1"/>
+          <p:cNvSpPr>
+            <a:spLocks noGrp="1"/>
+          </p:cNvSpPr>
+          <p:nvPr>
+            <p:ph type="title"/>
+          </p:nvPr>
+        </p:nvSpPr>
+        <p:spPr/>
+        <p:txBody>
+          <a:bodyPr/>
+          <a:p>
+            <a:r>
+              <a:rPr lang="zh-CN" altLang="en-US"/>
+              <a:t>分布式系统分布式对象</a:t>
+            </a:r>
+            <a:endParaRPr lang="zh-CN" altLang="en-US"/>
+          </a:p>
+        </p:txBody>
+      </p:sp>
+      <p:sp>
+        <p:nvSpPr>
+          <p:cNvPr id="3" name="内容占位符 2"/>
+          <p:cNvSpPr>
+            <a:spLocks noGrp="1"/>
+          </p:cNvSpPr>
+          <p:nvPr>
+            <p:ph idx="1"/>
+          </p:nvPr>
+        </p:nvSpPr>
+        <p:spPr/>
+        <p:txBody>
+          <a:bodyPr/>
+          <a:p>
+            <a:r>
+              <a:rPr lang="en-US" altLang="zh-CN"/>
+              <a:t>Redis</a:t>
+            </a:r>
+            <a:r>
+              <a:rPr lang="zh-CN" altLang="en-US"/>
+              <a:t>： </a:t>
+            </a:r>
+            <a:r>
+              <a:rPr lang="en-US" altLang="zh-CN"/>
+              <a:t>Redisson</a:t>
+            </a:r>
+            <a:r>
+              <a:rPr lang="zh-CN" altLang="en-US"/>
+              <a:t>库：</a:t>
+            </a:r>
+            <a:r>
+              <a:rPr lang="en-US" altLang="zh-CN"/>
+              <a:t>RLock</a:t>
+            </a:r>
+            <a:r>
+              <a:rPr lang="zh-CN" altLang="en-US"/>
+              <a:t>，</a:t>
+            </a:r>
+            <a:r>
+              <a:rPr lang="en-US" altLang="zh-CN"/>
+              <a:t>RMap</a:t>
+            </a:r>
+            <a:r>
+              <a:rPr lang="zh-CN" altLang="en-US"/>
+              <a:t>，</a:t>
+            </a:r>
+            <a:r>
+              <a:rPr lang="en-US" altLang="zh-CN"/>
+              <a:t>RQueue</a:t>
+            </a:r>
+            <a:r>
+              <a:rPr lang="zh-CN" altLang="en-US"/>
+              <a:t>等对象</a:t>
+            </a:r>
+            <a:endParaRPr lang="zh-CN" altLang="en-US"/>
+          </a:p>
+          <a:p>
+            <a:endParaRPr lang="zh-CN" altLang="en-US"/>
+          </a:p>
+          <a:p>
+            <a:endParaRPr lang="zh-CN" altLang="en-US"/>
+          </a:p>
+          <a:p>
+            <a:r>
+              <a:rPr lang="en-US" altLang="zh-CN"/>
+              <a:t>Zookeeper</a:t>
+            </a:r>
+            <a:r>
+              <a:rPr lang="zh-CN" altLang="en-US"/>
+              <a:t>： </a:t>
+            </a:r>
+            <a:r>
+              <a:rPr lang="en-US" altLang="zh-CN"/>
+              <a:t>Netflix Curator </a:t>
+            </a:r>
+            <a:r>
+              <a:rPr lang="zh-CN" altLang="en-US"/>
+              <a:t>库： </a:t>
+            </a:r>
+            <a:r>
+              <a:rPr lang="en-US" altLang="zh-CN"/>
+              <a:t>Lock</a:t>
+            </a:r>
+            <a:r>
+              <a:rPr lang="zh-CN" altLang="en-US"/>
+              <a:t>，</a:t>
+            </a:r>
+            <a:r>
+              <a:rPr lang="en-US" altLang="zh-CN"/>
+              <a:t>Queue</a:t>
+            </a:r>
+            <a:r>
+              <a:rPr lang="zh-CN" altLang="en-US"/>
+              <a:t>等对象</a:t>
+            </a:r>
+            <a:endParaRPr lang="zh-CN" altLang="en-US"/>
+          </a:p>
+        </p:txBody>
+      </p:sp>
+    </p:spTree>
+    <p:custDataLst>
+      <p:tags r:id="rId1"/>
+    </p:custDataLst>
+  </p:cSld>
+  <p:clrMapOvr>
+    <a:masterClrMapping/>
+  </p:clrMapOvr>
+</p:sld>
+</file>
+
+<file path=ppt/slides/slide48.xml><?xml version="1.0" encoding="utf-8"?>
+<p:sld xmlns:a="http://schemas.openxmlformats.org/drawingml/2006/main" xmlns:r="http://schemas.openxmlformats.org/officeDocument/2006/relationships" xmlns:p="http://schemas.openxmlformats.org/presentationml/2006/main">
+  <p:cSld>
+    <p:spTree>
+      <p:nvGrpSpPr>
+        <p:cNvPr id="1" name=""/>
+        <p:cNvGrpSpPr/>
+        <p:nvPr/>
+      </p:nvGrpSpPr>
+      <p:grpSpPr/>
+      <p:sp>
+        <p:nvSpPr>
+          <p:cNvPr id="2" name="标题 1"/>
+          <p:cNvSpPr>
+            <a:spLocks noGrp="1"/>
+          </p:cNvSpPr>
+          <p:nvPr>
+            <p:ph type="title"/>
+          </p:nvPr>
+        </p:nvSpPr>
+        <p:spPr/>
+        <p:txBody>
+          <a:bodyPr/>
+          <a:p>
+            <a:endParaRPr lang="zh-CN" altLang="en-US"/>
+          </a:p>
+        </p:txBody>
+      </p:sp>
+      <p:sp>
+        <p:nvSpPr>
+          <p:cNvPr id="3" name="内容占位符 2"/>
+          <p:cNvSpPr>
+            <a:spLocks noGrp="1"/>
+          </p:cNvSpPr>
+          <p:nvPr>
+            <p:ph idx="1"/>
+          </p:nvPr>
+        </p:nvSpPr>
+        <p:spPr/>
+        <p:txBody>
+          <a:bodyPr/>
+          <a:p>
+            <a:r>
+              <a:rPr lang="zh-CN" altLang="en-US"/>
+              <a:t>https://www.2cto.com/kf/201803/728799.html</a:t>
+            </a:r>
+            <a:endParaRPr lang="zh-CN" altLang="en-US"/>
+          </a:p>
+          <a:p>
+            <a:r>
+              <a:rPr lang="zh-CN" altLang="en-US"/>
+              <a:t>配合spring-tx实现事务的原理</a:t>
+            </a:r>
+            <a:endParaRPr lang="zh-CN" altLang="en-US"/>
+          </a:p>
+          <a:p>
+            <a:endParaRPr lang="zh-CN" altLang="en-US"/>
+          </a:p>
+          <a:p>
+            <a:r>
+              <a:rPr lang="zh-CN" altLang="en-US"/>
+              <a:t>https://blog.csdn.net/weixin_42861564/article/details/81590093</a:t>
+            </a:r>
+            <a:endParaRPr lang="zh-CN" altLang="en-US"/>
+          </a:p>
+          <a:p>
+            <a:r>
+              <a:rPr lang="en-US" altLang="zh-CN"/>
+              <a:t>Spring</a:t>
+            </a:r>
+            <a:r>
+              <a:rPr lang="zh-CN" altLang="en-US"/>
+              <a:t>事务同步</a:t>
             </a:r>
             <a:endParaRPr lang="zh-CN" altLang="en-US"/>
           </a:p>
@@ -11508,8 +13251,88 @@
 </p:tagLst>
 </file>
 
+<file path=ppt/tags/tag43.xml><?xml version="1.0" encoding="utf-8"?>
+<p:tagLst xmlns:p="http://schemas.openxmlformats.org/presentationml/2006/main">
+  <p:tag name="KSO_WM_BEAUTIFY_FLAG" val="#wm#"/>
+  <p:tag name="KSO_WM_TEMPLATE_CATEGORY" val="custom"/>
+  <p:tag name="KSO_WM_TEMPLATE_INDEX" val="20184545"/>
+</p:tagLst>
+</file>
+
+<file path=ppt/tags/tag44.xml><?xml version="1.0" encoding="utf-8"?>
+<p:tagLst xmlns:p="http://schemas.openxmlformats.org/presentationml/2006/main">
+  <p:tag name="KSO_WM_BEAUTIFY_FLAG" val="#wm#"/>
+  <p:tag name="KSO_WM_TEMPLATE_CATEGORY" val="custom"/>
+  <p:tag name="KSO_WM_TEMPLATE_INDEX" val="20184545"/>
+</p:tagLst>
+</file>
+
+<file path=ppt/tags/tag45.xml><?xml version="1.0" encoding="utf-8"?>
+<p:tagLst xmlns:p="http://schemas.openxmlformats.org/presentationml/2006/main">
+  <p:tag name="KSO_WM_BEAUTIFY_FLAG" val="#wm#"/>
+  <p:tag name="KSO_WM_TEMPLATE_CATEGORY" val="custom"/>
+  <p:tag name="KSO_WM_TEMPLATE_INDEX" val="20184545"/>
+</p:tagLst>
+</file>
+
+<file path=ppt/tags/tag46.xml><?xml version="1.0" encoding="utf-8"?>
+<p:tagLst xmlns:p="http://schemas.openxmlformats.org/presentationml/2006/main">
+  <p:tag name="KSO_WM_BEAUTIFY_FLAG" val="#wm#"/>
+  <p:tag name="KSO_WM_TEMPLATE_CATEGORY" val="custom"/>
+  <p:tag name="KSO_WM_TEMPLATE_INDEX" val="20184545"/>
+</p:tagLst>
+</file>
+
+<file path=ppt/tags/tag47.xml><?xml version="1.0" encoding="utf-8"?>
+<p:tagLst xmlns:p="http://schemas.openxmlformats.org/presentationml/2006/main">
+  <p:tag name="KSO_WM_BEAUTIFY_FLAG" val="#wm#"/>
+  <p:tag name="KSO_WM_TEMPLATE_CATEGORY" val="custom"/>
+  <p:tag name="KSO_WM_TEMPLATE_INDEX" val="20184545"/>
+</p:tagLst>
+</file>
+
+<file path=ppt/tags/tag48.xml><?xml version="1.0" encoding="utf-8"?>
+<p:tagLst xmlns:p="http://schemas.openxmlformats.org/presentationml/2006/main">
+  <p:tag name="KSO_WM_BEAUTIFY_FLAG" val="#wm#"/>
+  <p:tag name="KSO_WM_TEMPLATE_CATEGORY" val="custom"/>
+  <p:tag name="KSO_WM_TEMPLATE_INDEX" val="20184545"/>
+</p:tagLst>
+</file>
+
+<file path=ppt/tags/tag49.xml><?xml version="1.0" encoding="utf-8"?>
+<p:tagLst xmlns:p="http://schemas.openxmlformats.org/presentationml/2006/main">
+  <p:tag name="KSO_WM_BEAUTIFY_FLAG" val="#wm#"/>
+  <p:tag name="KSO_WM_TEMPLATE_CATEGORY" val="custom"/>
+  <p:tag name="KSO_WM_TEMPLATE_INDEX" val="20184545"/>
+</p:tagLst>
+</file>
+
 <file path=ppt/tags/tag5.xml><?xml version="1.0" encoding="utf-8"?>
 <p:tagLst xmlns:p="http://schemas.openxmlformats.org/presentationml/2006/main">
+  <p:tag name="KSO_WM_TEMPLATE_CATEGORY" val="custom"/>
+  <p:tag name="KSO_WM_TEMPLATE_INDEX" val="20184545"/>
+</p:tagLst>
+</file>
+
+<file path=ppt/tags/tag50.xml><?xml version="1.0" encoding="utf-8"?>
+<p:tagLst xmlns:p="http://schemas.openxmlformats.org/presentationml/2006/main">
+  <p:tag name="KSO_WM_BEAUTIFY_FLAG" val="#wm#"/>
+  <p:tag name="KSO_WM_TEMPLATE_CATEGORY" val="custom"/>
+  <p:tag name="KSO_WM_TEMPLATE_INDEX" val="20184545"/>
+</p:tagLst>
+</file>
+
+<file path=ppt/tags/tag51.xml><?xml version="1.0" encoding="utf-8"?>
+<p:tagLst xmlns:p="http://schemas.openxmlformats.org/presentationml/2006/main">
+  <p:tag name="KSO_WM_BEAUTIFY_FLAG" val="#wm#"/>
+  <p:tag name="KSO_WM_TEMPLATE_CATEGORY" val="custom"/>
+  <p:tag name="KSO_WM_TEMPLATE_INDEX" val="20184545"/>
+</p:tagLst>
+</file>
+
+<file path=ppt/tags/tag52.xml><?xml version="1.0" encoding="utf-8"?>
+<p:tagLst xmlns:p="http://schemas.openxmlformats.org/presentationml/2006/main">
+  <p:tag name="KSO_WM_BEAUTIFY_FLAG" val="#wm#"/>
   <p:tag name="KSO_WM_TEMPLATE_CATEGORY" val="custom"/>
   <p:tag name="KSO_WM_TEMPLATE_INDEX" val="20184545"/>
 </p:tagLst>

</xml_diff>

<commit_message>
added new demo project , jta doesn't work
</commit_message>
<xml_diff>
--- a/docs/distributedsystemtransaction.pptx
+++ b/docs/distributedsystemtransaction.pptx
@@ -233,8 +233,12 @@
             <p14:sldId id="624"/>
             <p14:sldId id="728"/>
             <p14:sldId id="727"/>
+            <p14:sldId id="262"/>
+            <p14:sldId id="263"/>
+            <p14:sldId id="289"/>
             <p14:sldId id="280"/>
             <p14:sldId id="625"/>
+            <p14:sldId id="282"/>
             <p14:sldId id="283"/>
             <p14:sldId id="680"/>
             <p14:sldId id="681"/>
@@ -244,10 +248,6 @@
             <p14:sldId id="264"/>
             <p14:sldId id="266"/>
             <p14:sldId id="623"/>
-            <p14:sldId id="282"/>
-            <p14:sldId id="262"/>
-            <p14:sldId id="263"/>
-            <p14:sldId id="289"/>
           </p14:sldIdLst>
         </p14:section>
         <p14:section name="事务同步模式" id="{A1E4495F-3EF2-4370-A049-5EA14E4C5B0B}">
@@ -255,19 +255,19 @@
             <p14:sldId id="267"/>
             <p14:sldId id="729"/>
             <p14:sldId id="268"/>
+            <p14:sldId id="733"/>
             <p14:sldId id="732"/>
+            <p14:sldId id="739"/>
             <p14:sldId id="738"/>
+            <p14:sldId id="731"/>
+            <p14:sldId id="740"/>
+            <p14:sldId id="741"/>
             <p14:sldId id="276"/>
+            <p14:sldId id="742"/>
             <p14:sldId id="734"/>
             <p14:sldId id="735"/>
             <p14:sldId id="736"/>
             <p14:sldId id="737"/>
-            <p14:sldId id="731"/>
-            <p14:sldId id="733"/>
-            <p14:sldId id="739"/>
-            <p14:sldId id="740"/>
-            <p14:sldId id="741"/>
-            <p14:sldId id="742"/>
           </p14:sldIdLst>
         </p14:section>
         <p14:section name="分布式事务实现的技术" id="{DA5C7AD6-713F-4A2F-997D-27194B135141}">
@@ -2045,13 +2045,7 @@
               <a:rPr lang="zh-CN" altLang="en-US">
                 <a:sym typeface="+mn-ea"/>
               </a:rPr>
-              <a:t>也就是说，</a:t>
-            </a:r>
-            <a:r>
-              <a:rPr lang="zh-CN" altLang="en-US">
-                <a:sym typeface="+mn-ea"/>
-              </a:rPr>
-              <a:t>如果调用者已存在一个事务上下文，则当前方法加入该事务；如果调用者不存在一个事务上下文，则当前方法也不会在事务中运行。</a:t>
+              <a:t>也就是说，如果调用者已存在一个事务上下文，则当前方法加入该事务；如果调用者不存在一个事务上下文，则当前方法也不会在事务中运行。</a:t>
             </a:r>
             <a:endParaRPr lang="zh-CN" altLang="en-US">
               <a:sym typeface="+mn-ea"/>
@@ -2815,6 +2809,30 @@
             <a:r>
               <a:rPr lang="zh-CN" altLang="en-US"/>
               <a:t>事务接口通过线程里的事务管理器来进行管理。</a:t>
+            </a:r>
+            <a:endParaRPr lang="zh-CN" altLang="en-US"/>
+          </a:p>
+          <a:p>
+            <a:endParaRPr lang="zh-CN" altLang="en-US"/>
+          </a:p>
+          <a:p>
+            <a:endParaRPr lang="en-US" altLang="zh-CN"/>
+          </a:p>
+          <a:p>
+            <a:r>
+              <a:rPr lang="en-US" altLang="zh-CN"/>
+              <a:t>Atomikos&amp;Bitronix </a:t>
+            </a:r>
+            <a:r>
+              <a:rPr lang="zh-CN" altLang="en-US"/>
+              <a:t>比较</a:t>
+            </a:r>
+            <a:endParaRPr lang="zh-CN" altLang="en-US"/>
+          </a:p>
+          <a:p>
+            <a:r>
+              <a:rPr lang="zh-CN" altLang="en-US"/>
+              <a:t>https://www.jianshu.com/p/cf8e01afd710</a:t>
             </a:r>
             <a:endParaRPr lang="zh-CN" altLang="en-US"/>
           </a:p>
@@ -13440,6 +13458,14 @@
               <a:rPr lang="en-US" altLang="zh-CN"/>
               <a:t>Bitronix</a:t>
             </a:r>
+            <a:r>
+              <a:rPr lang="zh-CN" altLang="en-US"/>
+              <a:t>、</a:t>
+            </a:r>
+            <a:r>
+              <a:rPr lang="en-US" altLang="zh-CN"/>
+              <a:t>JOTM</a:t>
+            </a:r>
             <a:endParaRPr lang="zh-CN" altLang="en-US"/>
           </a:p>
           <a:p>
@@ -14452,7 +14478,6 @@
           <a:p>
             <a:r>
               <a:rPr lang="en-US" altLang="zh-CN" i="1">
-                <a:ln/>
                 <a:solidFill>
                   <a:schemeClr val="tx1"/>
                 </a:solidFill>
@@ -14469,7 +14494,6 @@
             </a:r>
             <a:r>
               <a:rPr lang="zh-CN" altLang="en-US" i="1">
-                <a:ln/>
                 <a:solidFill>
                   <a:schemeClr val="tx1"/>
                 </a:solidFill>
@@ -16076,11 +16100,7 @@
           <a:p>
             <a:r>
               <a:rPr lang="zh-CN" altLang="en-US"/>
-              <a:t>模式选择（根据</a:t>
-            </a:r>
-            <a:r>
-              <a:rPr lang="zh-CN" altLang="en-US"/>
-              <a:t>一致性需求）</a:t>
+              <a:t>模式选择（根据一致性需求）</a:t>
             </a:r>
             <a:endParaRPr lang="zh-CN" altLang="en-US"/>
           </a:p>

</xml_diff>